<commit_message>
ppt update, chi square update
</commit_message>
<xml_diff>
--- a/Project_power_point.pptx
+++ b/Project_power_point.pptx
@@ -24454,8 +24454,8 @@
         </p:nvSpPr>
         <p:spPr>
           <a:xfrm>
-            <a:off x="3204642" y="2353641"/>
-            <a:ext cx="5531686" cy="2150719"/>
+            <a:off x="3591495" y="816044"/>
+            <a:ext cx="5084631" cy="1666828"/>
           </a:xfrm>
           <a:noFill/>
         </p:spPr>
@@ -24524,7 +24524,7 @@
         </p:nvSpPr>
         <p:spPr>
           <a:xfrm>
-            <a:off x="4439633" y="4518923"/>
+            <a:off x="4478659" y="5057028"/>
             <a:ext cx="3312734" cy="1141851"/>
           </a:xfrm>
           <a:noFill/>
@@ -24686,6 +24686,42 @@
           </a:p>
         </p:txBody>
       </p:sp>
+      <p:pic>
+        <p:nvPicPr>
+          <p:cNvPr id="5" name="Picture 4">
+            <a:extLst>
+              <a:ext uri="{FF2B5EF4-FFF2-40B4-BE49-F238E27FC236}">
+                <a16:creationId xmlns:a16="http://schemas.microsoft.com/office/drawing/2014/main" id="{077DC354-8F8C-4B3E-BEC4-D53693D376AA}"/>
+              </a:ext>
+            </a:extLst>
+          </p:cNvPr>
+          <p:cNvPicPr>
+            <a:picLocks noChangeAspect="1"/>
+          </p:cNvPicPr>
+          <p:nvPr/>
+        </p:nvPicPr>
+        <p:blipFill>
+          <a:blip r:embed="rId2">
+            <a:extLst>
+              <a:ext uri="{28A0092B-C50C-407E-A947-70E740481C1C}">
+                <a14:useLocalDpi xmlns:a14="http://schemas.microsoft.com/office/drawing/2010/main" val="0"/>
+              </a:ext>
+            </a:extLst>
+          </a:blip>
+          <a:stretch>
+            <a:fillRect/>
+          </a:stretch>
+        </p:blipFill>
+        <p:spPr>
+          <a:xfrm>
+            <a:off x="4265417" y="2370494"/>
+            <a:ext cx="3959654" cy="2639769"/>
+          </a:xfrm>
+          <a:prstGeom prst="rect">
+            <a:avLst/>
+          </a:prstGeom>
+        </p:spPr>
+      </p:pic>
     </p:spTree>
     <p:extLst>
       <p:ext uri="{BB962C8B-B14F-4D97-AF65-F5344CB8AC3E}">
@@ -31729,7 +31765,7 @@
         </p:blipFill>
         <p:spPr>
           <a:xfrm>
-            <a:off x="1105823" y="2037100"/>
+            <a:off x="860722" y="1372286"/>
             <a:ext cx="5485714" cy="3657143"/>
           </a:xfrm>
           <a:prstGeom prst="rect">
@@ -31753,13 +31789,13 @@
             <p:ph idx="1"/>
             <p:extLst>
               <p:ext uri="{D42A27DB-BD31-4B8C-83A1-F6EECF244321}">
-                <p14:modId xmlns:p14="http://schemas.microsoft.com/office/powerpoint/2010/main" val="910573761"/>
+                <p14:modId xmlns:p14="http://schemas.microsoft.com/office/powerpoint/2010/main" val="3704969277"/>
               </p:ext>
             </p:extLst>
           </p:nvPr>
         </p:nvGraphicFramePr>
         <p:xfrm>
-          <a:off x="8139827" y="1817198"/>
+          <a:off x="6563691" y="2451809"/>
           <a:ext cx="1712951" cy="2155472"/>
         </p:xfrm>
         <a:graphic>
@@ -32388,7 +32424,7 @@
                     <a:p>
                       <a:pPr algn="r" fontAlgn="b"/>
                       <a:r>
-                        <a:rPr lang="en-US" sz="1100" b="0" i="0" u="none" strike="noStrike">
+                        <a:rPr lang="en-US" sz="1100" b="0" i="0" u="none" strike="noStrike" dirty="0">
                           <a:solidFill>
                             <a:srgbClr val="000000"/>
                           </a:solidFill>
@@ -32801,7 +32837,7 @@
                     <a:p>
                       <a:pPr algn="r" fontAlgn="b"/>
                       <a:r>
-                        <a:rPr lang="en-US" sz="1100" b="0" i="0" u="none" strike="noStrike">
+                        <a:rPr lang="en-US" sz="1100" b="0" i="0" u="none" strike="noStrike" dirty="0">
                           <a:solidFill>
                             <a:srgbClr val="000000"/>
                           </a:solidFill>
@@ -33231,8 +33267,8 @@
         </p:nvSpPr>
         <p:spPr>
           <a:xfrm>
-            <a:off x="6816090" y="4889016"/>
-            <a:ext cx="3987529" cy="1615827"/>
+            <a:off x="8777840" y="2577108"/>
+            <a:ext cx="3086811" cy="1954381"/>
           </a:xfrm>
           <a:prstGeom prst="rect">
             <a:avLst/>
@@ -33305,14 +33341,14 @@
           <p:nvPr>
             <p:extLst>
               <p:ext uri="{D42A27DB-BD31-4B8C-83A1-F6EECF244321}">
-                <p14:modId xmlns:p14="http://schemas.microsoft.com/office/powerpoint/2010/main" val="27859378"/>
+                <p14:modId xmlns:p14="http://schemas.microsoft.com/office/powerpoint/2010/main" val="253459019"/>
               </p:ext>
             </p:extLst>
           </p:nvPr>
         </p:nvGraphicFramePr>
         <p:xfrm>
-          <a:off x="6671310" y="4103101"/>
-          <a:ext cx="4808220" cy="609764"/>
+          <a:off x="1450196" y="5389218"/>
+          <a:ext cx="9985911" cy="914646"/>
         </p:xfrm>
         <a:graphic>
           <a:graphicData uri="http://schemas.openxmlformats.org/drawingml/2006/table">
@@ -33321,21 +33357,28 @@
                 <a:tableStyleId>{5C22544A-7EE6-4342-B048-85BDC9FD1C3A}</a:tableStyleId>
               </a:tblPr>
               <a:tblGrid>
-                <a:gridCol w="1602740">
+                <a:gridCol w="2496478">
+                  <a:extLst>
+                    <a:ext uri="{9D8B030D-6E8A-4147-A177-3AD203B41FA5}">
+                      <a16:colId xmlns:a16="http://schemas.microsoft.com/office/drawing/2014/main" val="2942373384"/>
+                    </a:ext>
+                  </a:extLst>
+                </a:gridCol>
+                <a:gridCol w="2496478">
                   <a:extLst>
                     <a:ext uri="{9D8B030D-6E8A-4147-A177-3AD203B41FA5}">
                       <a16:colId xmlns:a16="http://schemas.microsoft.com/office/drawing/2014/main" val="3172858272"/>
                     </a:ext>
                   </a:extLst>
                 </a:gridCol>
-                <a:gridCol w="1993591">
+                <a:gridCol w="3105279">
                   <a:extLst>
                     <a:ext uri="{9D8B030D-6E8A-4147-A177-3AD203B41FA5}">
                       <a16:colId xmlns:a16="http://schemas.microsoft.com/office/drawing/2014/main" val="163572070"/>
                     </a:ext>
                   </a:extLst>
                 </a:gridCol>
-                <a:gridCol w="1211889">
+                <a:gridCol w="1887676">
                   <a:extLst>
                     <a:ext uri="{9D8B030D-6E8A-4147-A177-3AD203B41FA5}">
                       <a16:colId xmlns:a16="http://schemas.microsoft.com/office/drawing/2014/main" val="2593596276"/>
@@ -33344,6 +33387,19 @@
                 </a:gridCol>
               </a:tblGrid>
               <a:tr h="304882">
+                <a:tc>
+                  <a:txBody>
+                    <a:bodyPr/>
+                    <a:lstStyle/>
+                    <a:p>
+                      <a:r>
+                        <a:rPr lang="en-US" sz="1100" dirty="0"/>
+                        <a:t>Years</a:t>
+                      </a:r>
+                    </a:p>
+                  </a:txBody>
+                  <a:tcPr/>
+                </a:tc>
                 <a:tc>
                   <a:txBody>
                     <a:bodyPr/>
@@ -33390,6 +33446,95 @@
                 </a:extLst>
               </a:tr>
               <a:tr h="304882">
+                <a:tc>
+                  <a:txBody>
+                    <a:bodyPr/>
+                    <a:lstStyle/>
+                    <a:p>
+                      <a:r>
+                        <a:rPr lang="en-US" sz="1100" dirty="0"/>
+                        <a:t>2018-2019</a:t>
+                      </a:r>
+                    </a:p>
+                  </a:txBody>
+                  <a:tcPr/>
+                </a:tc>
+                <a:tc>
+                  <a:txBody>
+                    <a:bodyPr/>
+                    <a:lstStyle/>
+                    <a:p>
+                      <a:r>
+                        <a:rPr lang="en-US" sz="1100" dirty="0"/>
+                        <a:t>5.991464547107979</a:t>
+                      </a:r>
+                    </a:p>
+                  </a:txBody>
+                  <a:tcPr/>
+                </a:tc>
+                <a:tc>
+                  <a:txBody>
+                    <a:bodyPr/>
+                    <a:lstStyle/>
+                    <a:p>
+                      <a:r>
+                        <a:rPr lang="en-US" sz="1100" dirty="0"/>
+                        <a:t>591.0394315517315</a:t>
+                      </a:r>
+                    </a:p>
+                  </a:txBody>
+                  <a:tcPr/>
+                </a:tc>
+                <a:tc>
+                  <a:txBody>
+                    <a:bodyPr/>
+                    <a:lstStyle/>
+                    <a:p>
+                      <a:r>
+                        <a:rPr lang="en-US" sz="1100" dirty="0"/>
+                        <a:t>1.4887379627639045e-130</a:t>
+                      </a:r>
+                    </a:p>
+                  </a:txBody>
+                  <a:tcPr/>
+                </a:tc>
+                <a:extLst>
+                  <a:ext uri="{0D108BD9-81ED-4DB2-BD59-A6C34878D82A}">
+                    <a16:rowId xmlns:a16="http://schemas.microsoft.com/office/drawing/2014/main" val="2050680320"/>
+                  </a:ext>
+                </a:extLst>
+              </a:tr>
+              <a:tr h="304882">
+                <a:tc>
+                  <a:txBody>
+                    <a:bodyPr/>
+                    <a:lstStyle/>
+                    <a:p>
+                      <a:pPr marL="0" marR="0" lvl="0" indent="0" algn="l" defTabSz="914400" rtl="0" eaLnBrk="1" fontAlgn="auto" latinLnBrk="0" hangingPunct="1">
+                        <a:lnSpc>
+                          <a:spcPct val="100000"/>
+                        </a:lnSpc>
+                        <a:spcBef>
+                          <a:spcPts val="0"/>
+                        </a:spcBef>
+                        <a:spcAft>
+                          <a:spcPts val="0"/>
+                        </a:spcAft>
+                        <a:buClrTx/>
+                        <a:buSzTx/>
+                        <a:buFontTx/>
+                        <a:buNone/>
+                        <a:tabLst/>
+                        <a:defRPr/>
+                      </a:pPr>
+                      <a:r>
+                        <a:rPr lang="en-US" sz="1100" dirty="0"/>
+                        <a:t>2020-2021</a:t>
+                      </a:r>
+                    </a:p>
+                  </a:txBody>
+                  <a:tcPr/>
+                </a:tc>
                 <a:tc>
                   <a:txBody>
                     <a:bodyPr/>

</xml_diff>